<commit_message>
Did final changed in ppt
</commit_message>
<xml_diff>
--- a/tasks/Presentation/Slides_BWL.pptx
+++ b/tasks/Presentation/Slides_BWL.pptx
@@ -11,9 +11,11 @@
     <p:sldId id="260" r:id="rId5"/>
     <p:sldId id="261" r:id="rId6"/>
     <p:sldId id="262" r:id="rId7"/>
-    <p:sldId id="263" r:id="rId8"/>
-    <p:sldId id="259" r:id="rId9"/>
-    <p:sldId id="264" r:id="rId10"/>
+    <p:sldId id="266" r:id="rId8"/>
+    <p:sldId id="265" r:id="rId9"/>
+    <p:sldId id="263" r:id="rId10"/>
+    <p:sldId id="259" r:id="rId11"/>
+    <p:sldId id="264" r:id="rId12"/>
   </p:sldIdLst>
   <p:sldSz cx="9144000" cy="5143500" type="screen16x9"/>
   <p:notesSz cx="6858000" cy="9144000"/>
@@ -2081,653 +2083,7 @@
 </p:sld>
 </file>
 
-<file path=ppt/slides/slide2.xml><?xml version="1.0" encoding="utf-8"?>
-<p:sld xmlns:a="http://schemas.openxmlformats.org/drawingml/2006/main" xmlns:r="http://schemas.openxmlformats.org/officeDocument/2006/relationships" xmlns:p="http://schemas.openxmlformats.org/presentationml/2006/main">
-  <p:cSld>
-    <p:spTree>
-      <p:nvGrpSpPr>
-        <p:cNvPr id="1" name=""/>
-        <p:cNvGrpSpPr/>
-        <p:nvPr/>
-      </p:nvGrpSpPr>
-      <p:grpSpPr>
-        <a:xfrm>
-          <a:off x="0" y="0"/>
-          <a:ext cx="0" cy="0"/>
-          <a:chOff x="0" y="0"/>
-          <a:chExt cx="0" cy="0"/>
-        </a:xfrm>
-      </p:grpSpPr>
-      <p:sp>
-        <p:nvSpPr>
-          <p:cNvPr id="4" name="Titel 3"/>
-          <p:cNvSpPr>
-            <a:spLocks noGrp="1"/>
-          </p:cNvSpPr>
-          <p:nvPr>
-            <p:ph type="title"/>
-          </p:nvPr>
-        </p:nvSpPr>
-        <p:spPr/>
-        <p:txBody>
-          <a:bodyPr>
-            <a:normAutofit/>
-          </a:bodyPr>
-          <a:lstStyle/>
-          <a:p>
-            <a:r>
-              <a:rPr lang="de-CH" dirty="0" smtClean="0"/>
-              <a:t>AGENDA</a:t>
-            </a:r>
-            <a:endParaRPr lang="de-CH" dirty="0"/>
-          </a:p>
-        </p:txBody>
-      </p:sp>
-      <p:sp>
-        <p:nvSpPr>
-          <p:cNvPr id="5" name="Inhaltsplatzhalter 4"/>
-          <p:cNvSpPr>
-            <a:spLocks noGrp="1"/>
-          </p:cNvSpPr>
-          <p:nvPr>
-            <p:ph idx="1"/>
-          </p:nvPr>
-        </p:nvSpPr>
-        <p:spPr/>
-        <p:txBody>
-          <a:bodyPr/>
-          <a:lstStyle/>
-          <a:p>
-            <a:r>
-              <a:rPr lang="de-CH" dirty="0" smtClean="0"/>
-              <a:t>Technologien</a:t>
-            </a:r>
-          </a:p>
-          <a:p>
-            <a:r>
-              <a:rPr lang="de-CH" dirty="0" smtClean="0"/>
-              <a:t>Features</a:t>
-            </a:r>
-          </a:p>
-          <a:p>
-            <a:r>
-              <a:rPr lang="de-CH" dirty="0" smtClean="0"/>
-              <a:t>Arbeitsweise</a:t>
-            </a:r>
-          </a:p>
-          <a:p>
-            <a:r>
-              <a:rPr lang="de-CH" dirty="0" err="1"/>
-              <a:t>Lessons</a:t>
-            </a:r>
-            <a:r>
-              <a:rPr lang="de-CH" dirty="0"/>
-              <a:t> </a:t>
-            </a:r>
-            <a:r>
-              <a:rPr lang="de-CH" dirty="0" err="1"/>
-              <a:t>learnt</a:t>
-            </a:r>
-            <a:endParaRPr lang="de-CH" dirty="0" smtClean="0"/>
-          </a:p>
-          <a:p>
-            <a:r>
-              <a:rPr lang="de-CH" dirty="0" smtClean="0"/>
-              <a:t>Demo</a:t>
-            </a:r>
-            <a:endParaRPr lang="de-CH" dirty="0"/>
-          </a:p>
-        </p:txBody>
-      </p:sp>
-    </p:spTree>
-    <p:extLst>
-      <p:ext uri="{BB962C8B-B14F-4D97-AF65-F5344CB8AC3E}">
-        <p14:creationId xmlns:p14="http://schemas.microsoft.com/office/powerpoint/2010/main" val="4067639562"/>
-      </p:ext>
-    </p:extLst>
-  </p:cSld>
-  <p:clrMapOvr>
-    <a:masterClrMapping/>
-  </p:clrMapOvr>
-  <p:timing>
-    <p:tnLst>
-      <p:par>
-        <p:cTn id="1" dur="indefinite" restart="never" nodeType="tmRoot"/>
-      </p:par>
-    </p:tnLst>
-  </p:timing>
-</p:sld>
-</file>
-
-<file path=ppt/slides/slide3.xml><?xml version="1.0" encoding="utf-8"?>
-<p:sld xmlns:a="http://schemas.openxmlformats.org/drawingml/2006/main" xmlns:r="http://schemas.openxmlformats.org/officeDocument/2006/relationships" xmlns:p="http://schemas.openxmlformats.org/presentationml/2006/main">
-  <p:cSld>
-    <p:spTree>
-      <p:nvGrpSpPr>
-        <p:cNvPr id="1" name=""/>
-        <p:cNvGrpSpPr/>
-        <p:nvPr/>
-      </p:nvGrpSpPr>
-      <p:grpSpPr>
-        <a:xfrm>
-          <a:off x="0" y="0"/>
-          <a:ext cx="0" cy="0"/>
-          <a:chOff x="0" y="0"/>
-          <a:chExt cx="0" cy="0"/>
-        </a:xfrm>
-      </p:grpSpPr>
-      <p:sp>
-        <p:nvSpPr>
-          <p:cNvPr id="2" name="Titel 1"/>
-          <p:cNvSpPr>
-            <a:spLocks noGrp="1"/>
-          </p:cNvSpPr>
-          <p:nvPr>
-            <p:ph type="title"/>
-          </p:nvPr>
-        </p:nvSpPr>
-        <p:spPr/>
-        <p:txBody>
-          <a:bodyPr/>
-          <a:lstStyle/>
-          <a:p>
-            <a:r>
-              <a:rPr lang="de-CH" dirty="0" smtClean="0"/>
-              <a:t>Technologien</a:t>
-            </a:r>
-            <a:endParaRPr lang="de-CH" dirty="0"/>
-          </a:p>
-        </p:txBody>
-      </p:sp>
-      <p:sp>
-        <p:nvSpPr>
-          <p:cNvPr id="3" name="Inhaltsplatzhalter 2"/>
-          <p:cNvSpPr>
-            <a:spLocks noGrp="1"/>
-          </p:cNvSpPr>
-          <p:nvPr>
-            <p:ph idx="1"/>
-          </p:nvPr>
-        </p:nvSpPr>
-        <p:spPr/>
-        <p:txBody>
-          <a:bodyPr/>
-          <a:lstStyle/>
-          <a:p>
-            <a:r>
-              <a:rPr lang="de-CH" dirty="0" smtClean="0"/>
-              <a:t>XAMPP-Webserver</a:t>
-            </a:r>
-          </a:p>
-          <a:p>
-            <a:r>
-              <a:rPr lang="de-CH" dirty="0" smtClean="0"/>
-              <a:t>Frontend: HTML5, CSS3, JavaScript</a:t>
-            </a:r>
-          </a:p>
-          <a:p>
-            <a:r>
-              <a:rPr lang="de-CH" dirty="0" smtClean="0"/>
-              <a:t>Backend: PHP, </a:t>
-            </a:r>
-            <a:r>
-              <a:rPr lang="de-CH" dirty="0" err="1" smtClean="0"/>
-              <a:t>MySql</a:t>
-            </a:r>
-            <a:endParaRPr lang="de-CH" dirty="0" smtClean="0"/>
-          </a:p>
-          <a:p>
-            <a:r>
-              <a:rPr lang="de-CH" dirty="0" smtClean="0"/>
-              <a:t>Frameworks?</a:t>
-            </a:r>
-          </a:p>
-          <a:p>
-            <a:pPr lvl="1"/>
-            <a:r>
-              <a:rPr lang="de-CH" dirty="0" smtClean="0"/>
-              <a:t>Keine.</a:t>
-            </a:r>
-          </a:p>
-        </p:txBody>
-      </p:sp>
-    </p:spTree>
-    <p:extLst>
-      <p:ext uri="{BB962C8B-B14F-4D97-AF65-F5344CB8AC3E}">
-        <p14:creationId xmlns:p14="http://schemas.microsoft.com/office/powerpoint/2010/main" val="2899093108"/>
-      </p:ext>
-    </p:extLst>
-  </p:cSld>
-  <p:clrMapOvr>
-    <a:masterClrMapping/>
-  </p:clrMapOvr>
-  <p:timing>
-    <p:tnLst>
-      <p:par>
-        <p:cTn id="1" dur="indefinite" restart="never" nodeType="tmRoot"/>
-      </p:par>
-    </p:tnLst>
-  </p:timing>
-</p:sld>
-</file>
-
-<file path=ppt/slides/slide4.xml><?xml version="1.0" encoding="utf-8"?>
-<p:sld xmlns:a="http://schemas.openxmlformats.org/drawingml/2006/main" xmlns:r="http://schemas.openxmlformats.org/officeDocument/2006/relationships" xmlns:p="http://schemas.openxmlformats.org/presentationml/2006/main">
-  <p:cSld>
-    <p:spTree>
-      <p:nvGrpSpPr>
-        <p:cNvPr id="1" name=""/>
-        <p:cNvGrpSpPr/>
-        <p:nvPr/>
-      </p:nvGrpSpPr>
-      <p:grpSpPr>
-        <a:xfrm>
-          <a:off x="0" y="0"/>
-          <a:ext cx="0" cy="0"/>
-          <a:chOff x="0" y="0"/>
-          <a:chExt cx="0" cy="0"/>
-        </a:xfrm>
-      </p:grpSpPr>
-      <p:sp>
-        <p:nvSpPr>
-          <p:cNvPr id="2" name="Titel 1"/>
-          <p:cNvSpPr>
-            <a:spLocks noGrp="1"/>
-          </p:cNvSpPr>
-          <p:nvPr>
-            <p:ph type="title"/>
-          </p:nvPr>
-        </p:nvSpPr>
-        <p:spPr/>
-        <p:txBody>
-          <a:bodyPr>
-            <a:normAutofit/>
-          </a:bodyPr>
-          <a:lstStyle/>
-          <a:p>
-            <a:r>
-              <a:rPr lang="de-CH" dirty="0" smtClean="0"/>
-              <a:t>Features</a:t>
-            </a:r>
-            <a:endParaRPr lang="de-CH" dirty="0"/>
-          </a:p>
-        </p:txBody>
-      </p:sp>
-      <p:sp>
-        <p:nvSpPr>
-          <p:cNvPr id="3" name="Inhaltsplatzhalter 2"/>
-          <p:cNvSpPr>
-            <a:spLocks noGrp="1"/>
-          </p:cNvSpPr>
-          <p:nvPr>
-            <p:ph idx="1"/>
-          </p:nvPr>
-        </p:nvSpPr>
-        <p:spPr/>
-        <p:txBody>
-          <a:bodyPr/>
-          <a:lstStyle/>
-          <a:p>
-            <a:endParaRPr lang="de-CH"/>
-          </a:p>
-        </p:txBody>
-      </p:sp>
-    </p:spTree>
-    <p:extLst>
-      <p:ext uri="{BB962C8B-B14F-4D97-AF65-F5344CB8AC3E}">
-        <p14:creationId xmlns:p14="http://schemas.microsoft.com/office/powerpoint/2010/main" val="1834306008"/>
-      </p:ext>
-    </p:extLst>
-  </p:cSld>
-  <p:clrMapOvr>
-    <a:masterClrMapping/>
-  </p:clrMapOvr>
-  <p:timing>
-    <p:tnLst>
-      <p:par>
-        <p:cTn id="1" dur="indefinite" restart="never" nodeType="tmRoot"/>
-      </p:par>
-    </p:tnLst>
-  </p:timing>
-</p:sld>
-</file>
-
-<file path=ppt/slides/slide5.xml><?xml version="1.0" encoding="utf-8"?>
-<p:sld xmlns:a="http://schemas.openxmlformats.org/drawingml/2006/main" xmlns:r="http://schemas.openxmlformats.org/officeDocument/2006/relationships" xmlns:p="http://schemas.openxmlformats.org/presentationml/2006/main">
-  <p:cSld>
-    <p:spTree>
-      <p:nvGrpSpPr>
-        <p:cNvPr id="1" name=""/>
-        <p:cNvGrpSpPr/>
-        <p:nvPr/>
-      </p:nvGrpSpPr>
-      <p:grpSpPr>
-        <a:xfrm>
-          <a:off x="0" y="0"/>
-          <a:ext cx="0" cy="0"/>
-          <a:chOff x="0" y="0"/>
-          <a:chExt cx="0" cy="0"/>
-        </a:xfrm>
-      </p:grpSpPr>
-      <p:sp>
-        <p:nvSpPr>
-          <p:cNvPr id="2" name="Titel 1"/>
-          <p:cNvSpPr>
-            <a:spLocks noGrp="1"/>
-          </p:cNvSpPr>
-          <p:nvPr>
-            <p:ph type="title"/>
-          </p:nvPr>
-        </p:nvSpPr>
-        <p:spPr/>
-        <p:txBody>
-          <a:bodyPr/>
-          <a:lstStyle/>
-          <a:p>
-            <a:r>
-              <a:rPr lang="de-CH" dirty="0"/>
-              <a:t>Arbeitsweise</a:t>
-            </a:r>
-          </a:p>
-        </p:txBody>
-      </p:sp>
-      <p:sp>
-        <p:nvSpPr>
-          <p:cNvPr id="3" name="Inhaltsplatzhalter 2"/>
-          <p:cNvSpPr>
-            <a:spLocks noGrp="1"/>
-          </p:cNvSpPr>
-          <p:nvPr>
-            <p:ph idx="1"/>
-          </p:nvPr>
-        </p:nvSpPr>
-        <p:spPr/>
-        <p:txBody>
-          <a:bodyPr/>
-          <a:lstStyle/>
-          <a:p>
-            <a:r>
-              <a:rPr lang="de-CH" dirty="0" smtClean="0"/>
-              <a:t>Kanban ähnlicher Ansatz</a:t>
-            </a:r>
-          </a:p>
-          <a:p>
-            <a:pPr lvl="1"/>
-            <a:r>
-              <a:rPr lang="de-CH" dirty="0" smtClean="0"/>
-              <a:t>Tasks in </a:t>
-            </a:r>
-            <a:r>
-              <a:rPr lang="de-CH" dirty="0" err="1" smtClean="0"/>
-              <a:t>Trello</a:t>
-            </a:r>
-            <a:endParaRPr lang="de-CH" dirty="0" smtClean="0"/>
-          </a:p>
-          <a:p>
-            <a:pPr lvl="1"/>
-            <a:r>
-              <a:rPr lang="de-CH" dirty="0" smtClean="0"/>
-              <a:t>Wöchentliches neu priorisieren der Tasks</a:t>
-            </a:r>
-          </a:p>
-          <a:p>
-            <a:r>
-              <a:rPr lang="de-CH" dirty="0" smtClean="0"/>
-              <a:t>Aufteilung Frontend / Backend</a:t>
-            </a:r>
-          </a:p>
-          <a:p>
-            <a:pPr lvl="1"/>
-            <a:r>
-              <a:rPr lang="de-CH" dirty="0" smtClean="0"/>
-              <a:t>Eigenständiges HTML / CSS / JavaScript Template</a:t>
-            </a:r>
-          </a:p>
-          <a:p>
-            <a:pPr lvl="1"/>
-            <a:r>
-              <a:rPr lang="de-CH" dirty="0" smtClean="0"/>
-              <a:t>Vollfunktionsfähiges Backend mit Mock-Webpage</a:t>
-            </a:r>
-          </a:p>
-          <a:p>
-            <a:pPr lvl="1"/>
-            <a:r>
-              <a:rPr lang="de-CH" dirty="0" smtClean="0"/>
-              <a:t>Vordefinierte Templates / Marker</a:t>
-            </a:r>
-            <a:endParaRPr lang="de-CH" dirty="0"/>
-          </a:p>
-        </p:txBody>
-      </p:sp>
-    </p:spTree>
-    <p:extLst>
-      <p:ext uri="{BB962C8B-B14F-4D97-AF65-F5344CB8AC3E}">
-        <p14:creationId xmlns:p14="http://schemas.microsoft.com/office/powerpoint/2010/main" val="1927628795"/>
-      </p:ext>
-    </p:extLst>
-  </p:cSld>
-  <p:clrMapOvr>
-    <a:masterClrMapping/>
-  </p:clrMapOvr>
-  <p:timing>
-    <p:tnLst>
-      <p:par>
-        <p:cTn id="1" dur="indefinite" restart="never" nodeType="tmRoot"/>
-      </p:par>
-    </p:tnLst>
-  </p:timing>
-</p:sld>
-</file>
-
-<file path=ppt/slides/slide6.xml><?xml version="1.0" encoding="utf-8"?>
-<p:sld xmlns:a="http://schemas.openxmlformats.org/drawingml/2006/main" xmlns:r="http://schemas.openxmlformats.org/officeDocument/2006/relationships" xmlns:p="http://schemas.openxmlformats.org/presentationml/2006/main">
-  <p:cSld>
-    <p:spTree>
-      <p:nvGrpSpPr>
-        <p:cNvPr id="1" name=""/>
-        <p:cNvGrpSpPr/>
-        <p:nvPr/>
-      </p:nvGrpSpPr>
-      <p:grpSpPr>
-        <a:xfrm>
-          <a:off x="0" y="0"/>
-          <a:ext cx="0" cy="0"/>
-          <a:chOff x="0" y="0"/>
-          <a:chExt cx="0" cy="0"/>
-        </a:xfrm>
-      </p:grpSpPr>
-      <p:sp>
-        <p:nvSpPr>
-          <p:cNvPr id="2" name="Titel 1"/>
-          <p:cNvSpPr>
-            <a:spLocks noGrp="1"/>
-          </p:cNvSpPr>
-          <p:nvPr>
-            <p:ph type="title"/>
-          </p:nvPr>
-        </p:nvSpPr>
-        <p:spPr/>
-        <p:txBody>
-          <a:bodyPr>
-            <a:normAutofit/>
-          </a:bodyPr>
-          <a:lstStyle/>
-          <a:p>
-            <a:r>
-              <a:rPr lang="de-CH" dirty="0" err="1"/>
-              <a:t>Lessons</a:t>
-            </a:r>
-            <a:r>
-              <a:rPr lang="de-CH" dirty="0"/>
-              <a:t> </a:t>
-            </a:r>
-            <a:r>
-              <a:rPr lang="de-CH" dirty="0" err="1" smtClean="0"/>
-              <a:t>learnt</a:t>
-            </a:r>
-            <a:endParaRPr lang="de-CH" dirty="0"/>
-          </a:p>
-        </p:txBody>
-      </p:sp>
-      <p:sp>
-        <p:nvSpPr>
-          <p:cNvPr id="3" name="Inhaltsplatzhalter 2"/>
-          <p:cNvSpPr>
-            <a:spLocks noGrp="1"/>
-          </p:cNvSpPr>
-          <p:nvPr>
-            <p:ph idx="1"/>
-          </p:nvPr>
-        </p:nvSpPr>
-        <p:spPr/>
-        <p:txBody>
-          <a:bodyPr/>
-          <a:lstStyle/>
-          <a:p>
-            <a:r>
-              <a:rPr lang="de-CH" dirty="0" err="1" smtClean="0"/>
-              <a:t>Plain</a:t>
-            </a:r>
-            <a:r>
-              <a:rPr lang="de-CH" dirty="0" smtClean="0"/>
-              <a:t> HTML/CSS/JavaScript hat so seine Unschönheiten</a:t>
-            </a:r>
-          </a:p>
-          <a:p>
-            <a:r>
-              <a:rPr lang="de-CH" dirty="0" smtClean="0"/>
-              <a:t>Kleiner Projekte lassen sich durchaus ohne Frameworks realisieren – Sinnvoll?</a:t>
-            </a:r>
-          </a:p>
-          <a:p>
-            <a:r>
-              <a:rPr lang="de-CH" dirty="0" smtClean="0"/>
-              <a:t>Guter Einblick in die Technologien</a:t>
-            </a:r>
-          </a:p>
-          <a:p>
-            <a:pPr lvl="1"/>
-            <a:r>
-              <a:rPr lang="de-CH" dirty="0" smtClean="0"/>
-              <a:t>Hilft Frameworks besser zu verstehen</a:t>
-            </a:r>
-            <a:endParaRPr lang="de-CH" dirty="0"/>
-          </a:p>
-        </p:txBody>
-      </p:sp>
-    </p:spTree>
-    <p:extLst>
-      <p:ext uri="{BB962C8B-B14F-4D97-AF65-F5344CB8AC3E}">
-        <p14:creationId xmlns:p14="http://schemas.microsoft.com/office/powerpoint/2010/main" val="1982191759"/>
-      </p:ext>
-    </p:extLst>
-  </p:cSld>
-  <p:clrMapOvr>
-    <a:masterClrMapping/>
-  </p:clrMapOvr>
-  <p:timing>
-    <p:tnLst>
-      <p:par>
-        <p:cTn id="1" dur="indefinite" restart="never" nodeType="tmRoot"/>
-      </p:par>
-    </p:tnLst>
-  </p:timing>
-</p:sld>
-</file>
-
-<file path=ppt/slides/slide7.xml><?xml version="1.0" encoding="utf-8"?>
-<p:sld xmlns:a="http://schemas.openxmlformats.org/drawingml/2006/main" xmlns:r="http://schemas.openxmlformats.org/officeDocument/2006/relationships" xmlns:p="http://schemas.openxmlformats.org/presentationml/2006/main">
-  <p:cSld>
-    <p:spTree>
-      <p:nvGrpSpPr>
-        <p:cNvPr id="1" name=""/>
-        <p:cNvGrpSpPr/>
-        <p:nvPr/>
-      </p:nvGrpSpPr>
-      <p:grpSpPr>
-        <a:xfrm>
-          <a:off x="0" y="0"/>
-          <a:ext cx="0" cy="0"/>
-          <a:chOff x="0" y="0"/>
-          <a:chExt cx="0" cy="0"/>
-        </a:xfrm>
-      </p:grpSpPr>
-      <p:sp>
-        <p:nvSpPr>
-          <p:cNvPr id="2" name="Titel 1"/>
-          <p:cNvSpPr>
-            <a:spLocks noGrp="1"/>
-          </p:cNvSpPr>
-          <p:nvPr>
-            <p:ph type="title"/>
-          </p:nvPr>
-        </p:nvSpPr>
-        <p:spPr/>
-        <p:txBody>
-          <a:bodyPr/>
-          <a:lstStyle/>
-          <a:p>
-            <a:r>
-              <a:rPr lang="de-CH" dirty="0" smtClean="0"/>
-              <a:t>Live-Demo</a:t>
-            </a:r>
-            <a:endParaRPr lang="de-CH" dirty="0"/>
-          </a:p>
-        </p:txBody>
-      </p:sp>
-      <p:pic>
-        <p:nvPicPr>
-          <p:cNvPr id="4" name="Inhaltsplatzhalter 3">
-            <a:hlinkClick r:id="rId2"/>
-          </p:cNvPr>
-          <p:cNvPicPr>
-            <a:picLocks noGrp="1" noChangeAspect="1"/>
-          </p:cNvPicPr>
-          <p:nvPr>
-            <p:ph idx="1"/>
-          </p:nvPr>
-        </p:nvPicPr>
-        <p:blipFill>
-          <a:blip r:embed="rId3">
-            <a:extLst>
-              <a:ext uri="{28A0092B-C50C-407E-A947-70E740481C1C}">
-                <a14:useLocalDpi xmlns:a14="http://schemas.microsoft.com/office/drawing/2010/main" val="0"/>
-              </a:ext>
-            </a:extLst>
-          </a:blip>
-          <a:stretch>
-            <a:fillRect/>
-          </a:stretch>
-        </p:blipFill>
-        <p:spPr>
-          <a:xfrm>
-            <a:off x="1430744" y="1200150"/>
-            <a:ext cx="6282511" cy="3532188"/>
-          </a:xfrm>
-        </p:spPr>
-      </p:pic>
-    </p:spTree>
-    <p:extLst>
-      <p:ext uri="{BB962C8B-B14F-4D97-AF65-F5344CB8AC3E}">
-        <p14:creationId xmlns:p14="http://schemas.microsoft.com/office/powerpoint/2010/main" val="958242197"/>
-      </p:ext>
-    </p:extLst>
-  </p:cSld>
-  <p:clrMapOvr>
-    <a:masterClrMapping/>
-  </p:clrMapOvr>
-  <p:timing>
-    <p:tnLst>
-      <p:par>
-        <p:cTn id="1" dur="indefinite" restart="never" nodeType="tmRoot"/>
-      </p:par>
-    </p:tnLst>
-  </p:timing>
-</p:sld>
-</file>
-
-<file path=ppt/slides/slide8.xml><?xml version="1.0" encoding="utf-8"?>
+<file path=ppt/slides/slide10.xml><?xml version="1.0" encoding="utf-8"?>
 <p:sld xmlns:a="http://schemas.openxmlformats.org/drawingml/2006/main" xmlns:r="http://schemas.openxmlformats.org/officeDocument/2006/relationships" xmlns:p="http://schemas.openxmlformats.org/presentationml/2006/main">
   <p:cSld>
     <p:spTree>
@@ -2895,6 +2251,893 @@
     <p:bldLst>
       <p:bldP spid="5" grpId="0"/>
     </p:bldLst>
+  </p:timing>
+</p:sld>
+</file>
+
+<file path=ppt/slides/slide2.xml><?xml version="1.0" encoding="utf-8"?>
+<p:sld xmlns:a="http://schemas.openxmlformats.org/drawingml/2006/main" xmlns:r="http://schemas.openxmlformats.org/officeDocument/2006/relationships" xmlns:p="http://schemas.openxmlformats.org/presentationml/2006/main">
+  <p:cSld>
+    <p:spTree>
+      <p:nvGrpSpPr>
+        <p:cNvPr id="1" name=""/>
+        <p:cNvGrpSpPr/>
+        <p:nvPr/>
+      </p:nvGrpSpPr>
+      <p:grpSpPr>
+        <a:xfrm>
+          <a:off x="0" y="0"/>
+          <a:ext cx="0" cy="0"/>
+          <a:chOff x="0" y="0"/>
+          <a:chExt cx="0" cy="0"/>
+        </a:xfrm>
+      </p:grpSpPr>
+      <p:sp>
+        <p:nvSpPr>
+          <p:cNvPr id="4" name="Titel 3"/>
+          <p:cNvSpPr>
+            <a:spLocks noGrp="1"/>
+          </p:cNvSpPr>
+          <p:nvPr>
+            <p:ph type="title"/>
+          </p:nvPr>
+        </p:nvSpPr>
+        <p:spPr/>
+        <p:txBody>
+          <a:bodyPr>
+            <a:normAutofit/>
+          </a:bodyPr>
+          <a:lstStyle/>
+          <a:p>
+            <a:r>
+              <a:rPr lang="de-CH" dirty="0" smtClean="0"/>
+              <a:t>AGENDA</a:t>
+            </a:r>
+            <a:endParaRPr lang="de-CH" dirty="0"/>
+          </a:p>
+        </p:txBody>
+      </p:sp>
+      <p:sp>
+        <p:nvSpPr>
+          <p:cNvPr id="5" name="Inhaltsplatzhalter 4"/>
+          <p:cNvSpPr>
+            <a:spLocks noGrp="1"/>
+          </p:cNvSpPr>
+          <p:nvPr>
+            <p:ph idx="1"/>
+          </p:nvPr>
+        </p:nvSpPr>
+        <p:spPr/>
+        <p:txBody>
+          <a:bodyPr/>
+          <a:lstStyle/>
+          <a:p>
+            <a:r>
+              <a:rPr lang="de-CH" dirty="0" smtClean="0"/>
+              <a:t>Technologien</a:t>
+            </a:r>
+          </a:p>
+          <a:p>
+            <a:r>
+              <a:rPr lang="de-CH" dirty="0" smtClean="0"/>
+              <a:t>Features</a:t>
+            </a:r>
+          </a:p>
+          <a:p>
+            <a:r>
+              <a:rPr lang="de-CH" dirty="0" smtClean="0"/>
+              <a:t>Arbeitsweise</a:t>
+            </a:r>
+          </a:p>
+          <a:p>
+            <a:r>
+              <a:rPr lang="de-CH" dirty="0" err="1"/>
+              <a:t>Lessons</a:t>
+            </a:r>
+            <a:r>
+              <a:rPr lang="de-CH" dirty="0"/>
+              <a:t> </a:t>
+            </a:r>
+            <a:r>
+              <a:rPr lang="de-CH" dirty="0" err="1"/>
+              <a:t>learnt</a:t>
+            </a:r>
+            <a:endParaRPr lang="de-CH" dirty="0" smtClean="0"/>
+          </a:p>
+          <a:p>
+            <a:r>
+              <a:rPr lang="de-CH" dirty="0" smtClean="0"/>
+              <a:t>Demo</a:t>
+            </a:r>
+            <a:endParaRPr lang="de-CH" dirty="0"/>
+          </a:p>
+        </p:txBody>
+      </p:sp>
+    </p:spTree>
+    <p:extLst>
+      <p:ext uri="{BB962C8B-B14F-4D97-AF65-F5344CB8AC3E}">
+        <p14:creationId xmlns:p14="http://schemas.microsoft.com/office/powerpoint/2010/main" val="4067639562"/>
+      </p:ext>
+    </p:extLst>
+  </p:cSld>
+  <p:clrMapOvr>
+    <a:masterClrMapping/>
+  </p:clrMapOvr>
+  <p:timing>
+    <p:tnLst>
+      <p:par>
+        <p:cTn id="1" dur="indefinite" restart="never" nodeType="tmRoot"/>
+      </p:par>
+    </p:tnLst>
+  </p:timing>
+</p:sld>
+</file>
+
+<file path=ppt/slides/slide3.xml><?xml version="1.0" encoding="utf-8"?>
+<p:sld xmlns:a="http://schemas.openxmlformats.org/drawingml/2006/main" xmlns:r="http://schemas.openxmlformats.org/officeDocument/2006/relationships" xmlns:p="http://schemas.openxmlformats.org/presentationml/2006/main">
+  <p:cSld>
+    <p:spTree>
+      <p:nvGrpSpPr>
+        <p:cNvPr id="1" name=""/>
+        <p:cNvGrpSpPr/>
+        <p:nvPr/>
+      </p:nvGrpSpPr>
+      <p:grpSpPr>
+        <a:xfrm>
+          <a:off x="0" y="0"/>
+          <a:ext cx="0" cy="0"/>
+          <a:chOff x="0" y="0"/>
+          <a:chExt cx="0" cy="0"/>
+        </a:xfrm>
+      </p:grpSpPr>
+      <p:sp>
+        <p:nvSpPr>
+          <p:cNvPr id="2" name="Titel 1"/>
+          <p:cNvSpPr>
+            <a:spLocks noGrp="1"/>
+          </p:cNvSpPr>
+          <p:nvPr>
+            <p:ph type="title"/>
+          </p:nvPr>
+        </p:nvSpPr>
+        <p:spPr/>
+        <p:txBody>
+          <a:bodyPr/>
+          <a:lstStyle/>
+          <a:p>
+            <a:r>
+              <a:rPr lang="de-CH" dirty="0" smtClean="0"/>
+              <a:t>Technologien</a:t>
+            </a:r>
+            <a:endParaRPr lang="de-CH" dirty="0"/>
+          </a:p>
+        </p:txBody>
+      </p:sp>
+      <p:sp>
+        <p:nvSpPr>
+          <p:cNvPr id="3" name="Inhaltsplatzhalter 2"/>
+          <p:cNvSpPr>
+            <a:spLocks noGrp="1"/>
+          </p:cNvSpPr>
+          <p:nvPr>
+            <p:ph idx="1"/>
+          </p:nvPr>
+        </p:nvSpPr>
+        <p:spPr/>
+        <p:txBody>
+          <a:bodyPr/>
+          <a:lstStyle/>
+          <a:p>
+            <a:r>
+              <a:rPr lang="de-CH" dirty="0" smtClean="0"/>
+              <a:t>XAMPP-Webserver</a:t>
+            </a:r>
+          </a:p>
+          <a:p>
+            <a:r>
+              <a:rPr lang="de-CH" dirty="0" smtClean="0"/>
+              <a:t>Frontend: HTML5, CSS3, JavaScript</a:t>
+            </a:r>
+          </a:p>
+          <a:p>
+            <a:r>
+              <a:rPr lang="de-CH" dirty="0" smtClean="0"/>
+              <a:t>Backend: PHP, </a:t>
+            </a:r>
+            <a:r>
+              <a:rPr lang="de-CH" dirty="0" err="1" smtClean="0"/>
+              <a:t>MySql</a:t>
+            </a:r>
+            <a:endParaRPr lang="de-CH" dirty="0" smtClean="0"/>
+          </a:p>
+          <a:p>
+            <a:r>
+              <a:rPr lang="de-CH" dirty="0" smtClean="0"/>
+              <a:t>Frameworks?</a:t>
+            </a:r>
+          </a:p>
+          <a:p>
+            <a:pPr lvl="1"/>
+            <a:r>
+              <a:rPr lang="de-CH" dirty="0" smtClean="0"/>
+              <a:t>Keine.</a:t>
+            </a:r>
+          </a:p>
+        </p:txBody>
+      </p:sp>
+    </p:spTree>
+    <p:extLst>
+      <p:ext uri="{BB962C8B-B14F-4D97-AF65-F5344CB8AC3E}">
+        <p14:creationId xmlns:p14="http://schemas.microsoft.com/office/powerpoint/2010/main" val="2899093108"/>
+      </p:ext>
+    </p:extLst>
+  </p:cSld>
+  <p:clrMapOvr>
+    <a:masterClrMapping/>
+  </p:clrMapOvr>
+  <p:timing>
+    <p:tnLst>
+      <p:par>
+        <p:cTn id="1" dur="indefinite" restart="never" nodeType="tmRoot"/>
+      </p:par>
+    </p:tnLst>
+  </p:timing>
+</p:sld>
+</file>
+
+<file path=ppt/slides/slide4.xml><?xml version="1.0" encoding="utf-8"?>
+<p:sld xmlns:a="http://schemas.openxmlformats.org/drawingml/2006/main" xmlns:r="http://schemas.openxmlformats.org/officeDocument/2006/relationships" xmlns:p="http://schemas.openxmlformats.org/presentationml/2006/main">
+  <p:cSld>
+    <p:spTree>
+      <p:nvGrpSpPr>
+        <p:cNvPr id="1" name=""/>
+        <p:cNvGrpSpPr/>
+        <p:nvPr/>
+      </p:nvGrpSpPr>
+      <p:grpSpPr>
+        <a:xfrm>
+          <a:off x="0" y="0"/>
+          <a:ext cx="0" cy="0"/>
+          <a:chOff x="0" y="0"/>
+          <a:chExt cx="0" cy="0"/>
+        </a:xfrm>
+      </p:grpSpPr>
+      <p:sp>
+        <p:nvSpPr>
+          <p:cNvPr id="2" name="Titel 1"/>
+          <p:cNvSpPr>
+            <a:spLocks noGrp="1"/>
+          </p:cNvSpPr>
+          <p:nvPr>
+            <p:ph type="title"/>
+          </p:nvPr>
+        </p:nvSpPr>
+        <p:spPr/>
+        <p:txBody>
+          <a:bodyPr>
+            <a:normAutofit/>
+          </a:bodyPr>
+          <a:lstStyle/>
+          <a:p>
+            <a:r>
+              <a:rPr lang="de-CH" dirty="0" smtClean="0"/>
+              <a:t>Features</a:t>
+            </a:r>
+            <a:endParaRPr lang="de-CH" dirty="0"/>
+          </a:p>
+        </p:txBody>
+      </p:sp>
+      <p:sp>
+        <p:nvSpPr>
+          <p:cNvPr id="3" name="Inhaltsplatzhalter 2"/>
+          <p:cNvSpPr>
+            <a:spLocks noGrp="1"/>
+          </p:cNvSpPr>
+          <p:nvPr>
+            <p:ph idx="1"/>
+          </p:nvPr>
+        </p:nvSpPr>
+        <p:spPr/>
+        <p:txBody>
+          <a:bodyPr/>
+          <a:lstStyle/>
+          <a:p>
+            <a:r>
+              <a:rPr lang="de-CH" dirty="0" smtClean="0"/>
+              <a:t>Produktliste</a:t>
+            </a:r>
+          </a:p>
+          <a:p>
+            <a:r>
+              <a:rPr lang="de-CH" dirty="0" smtClean="0"/>
+              <a:t>Volltextsuche</a:t>
+            </a:r>
+          </a:p>
+          <a:p>
+            <a:r>
+              <a:rPr lang="de-CH" dirty="0" smtClean="0"/>
+              <a:t>Admin-Bereich</a:t>
+            </a:r>
+          </a:p>
+          <a:p>
+            <a:r>
+              <a:rPr lang="de-CH" dirty="0" err="1" smtClean="0"/>
+              <a:t>Basket</a:t>
+            </a:r>
+            <a:endParaRPr lang="de-CH" dirty="0"/>
+          </a:p>
+          <a:p>
+            <a:r>
+              <a:rPr lang="de-CH" dirty="0" err="1" smtClean="0"/>
+              <a:t>Responsive</a:t>
+            </a:r>
+            <a:r>
+              <a:rPr lang="de-CH" dirty="0" smtClean="0"/>
+              <a:t> (ersten Version nur Teilweise)</a:t>
+            </a:r>
+          </a:p>
+          <a:p>
+            <a:r>
+              <a:rPr lang="de-CH" dirty="0" smtClean="0"/>
+              <a:t>Zitat im </a:t>
+            </a:r>
+            <a:r>
+              <a:rPr lang="de-CH" dirty="0" err="1" smtClean="0"/>
+              <a:t>Footer</a:t>
+            </a:r>
+            <a:r>
+              <a:rPr lang="de-CH" dirty="0" smtClean="0"/>
+              <a:t> (Webservice)</a:t>
+            </a:r>
+            <a:endParaRPr lang="de-CH" dirty="0" smtClean="0"/>
+          </a:p>
+          <a:p>
+            <a:endParaRPr lang="de-CH" dirty="0"/>
+          </a:p>
+        </p:txBody>
+      </p:sp>
+    </p:spTree>
+    <p:extLst>
+      <p:ext uri="{BB962C8B-B14F-4D97-AF65-F5344CB8AC3E}">
+        <p14:creationId xmlns:p14="http://schemas.microsoft.com/office/powerpoint/2010/main" val="1834306008"/>
+      </p:ext>
+    </p:extLst>
+  </p:cSld>
+  <p:clrMapOvr>
+    <a:masterClrMapping/>
+  </p:clrMapOvr>
+  <p:timing>
+    <p:tnLst>
+      <p:par>
+        <p:cTn id="1" dur="indefinite" restart="never" nodeType="tmRoot"/>
+      </p:par>
+    </p:tnLst>
+  </p:timing>
+</p:sld>
+</file>
+
+<file path=ppt/slides/slide5.xml><?xml version="1.0" encoding="utf-8"?>
+<p:sld xmlns:a="http://schemas.openxmlformats.org/drawingml/2006/main" xmlns:r="http://schemas.openxmlformats.org/officeDocument/2006/relationships" xmlns:p="http://schemas.openxmlformats.org/presentationml/2006/main">
+  <p:cSld>
+    <p:spTree>
+      <p:nvGrpSpPr>
+        <p:cNvPr id="1" name=""/>
+        <p:cNvGrpSpPr/>
+        <p:nvPr/>
+      </p:nvGrpSpPr>
+      <p:grpSpPr>
+        <a:xfrm>
+          <a:off x="0" y="0"/>
+          <a:ext cx="0" cy="0"/>
+          <a:chOff x="0" y="0"/>
+          <a:chExt cx="0" cy="0"/>
+        </a:xfrm>
+      </p:grpSpPr>
+      <p:sp>
+        <p:nvSpPr>
+          <p:cNvPr id="2" name="Titel 1"/>
+          <p:cNvSpPr>
+            <a:spLocks noGrp="1"/>
+          </p:cNvSpPr>
+          <p:nvPr>
+            <p:ph type="title"/>
+          </p:nvPr>
+        </p:nvSpPr>
+        <p:spPr/>
+        <p:txBody>
+          <a:bodyPr/>
+          <a:lstStyle/>
+          <a:p>
+            <a:r>
+              <a:rPr lang="de-CH" dirty="0"/>
+              <a:t>Arbeitsweise</a:t>
+            </a:r>
+          </a:p>
+        </p:txBody>
+      </p:sp>
+      <p:sp>
+        <p:nvSpPr>
+          <p:cNvPr id="3" name="Inhaltsplatzhalter 2"/>
+          <p:cNvSpPr>
+            <a:spLocks noGrp="1"/>
+          </p:cNvSpPr>
+          <p:nvPr>
+            <p:ph idx="1"/>
+          </p:nvPr>
+        </p:nvSpPr>
+        <p:spPr/>
+        <p:txBody>
+          <a:bodyPr/>
+          <a:lstStyle/>
+          <a:p>
+            <a:r>
+              <a:rPr lang="de-CH" dirty="0" smtClean="0"/>
+              <a:t>Kanban ähnlicher Ansatz</a:t>
+            </a:r>
+          </a:p>
+          <a:p>
+            <a:pPr lvl="1"/>
+            <a:r>
+              <a:rPr lang="de-CH" dirty="0" smtClean="0"/>
+              <a:t>Tasks in </a:t>
+            </a:r>
+            <a:r>
+              <a:rPr lang="de-CH" dirty="0" err="1" smtClean="0"/>
+              <a:t>Trello</a:t>
+            </a:r>
+            <a:endParaRPr lang="de-CH" dirty="0" smtClean="0"/>
+          </a:p>
+          <a:p>
+            <a:pPr lvl="1"/>
+            <a:r>
+              <a:rPr lang="de-CH" dirty="0" smtClean="0"/>
+              <a:t>Wöchentliches neu priorisieren der Tasks</a:t>
+            </a:r>
+          </a:p>
+          <a:p>
+            <a:r>
+              <a:rPr lang="de-CH" dirty="0" smtClean="0"/>
+              <a:t>Aufteilung Frontend / Backend</a:t>
+            </a:r>
+          </a:p>
+          <a:p>
+            <a:pPr lvl="1"/>
+            <a:r>
+              <a:rPr lang="de-CH" dirty="0" smtClean="0"/>
+              <a:t>Eigenständiges HTML / CSS / JavaScript Template</a:t>
+            </a:r>
+          </a:p>
+          <a:p>
+            <a:pPr lvl="1"/>
+            <a:r>
+              <a:rPr lang="de-CH" dirty="0" smtClean="0"/>
+              <a:t>Vollfunktionsfähiges Backend mit Mock-Webpage</a:t>
+            </a:r>
+          </a:p>
+          <a:p>
+            <a:pPr lvl="1"/>
+            <a:r>
+              <a:rPr lang="de-CH" dirty="0" smtClean="0"/>
+              <a:t>Vordefinierte Templates / Marker</a:t>
+            </a:r>
+            <a:endParaRPr lang="de-CH" dirty="0"/>
+          </a:p>
+        </p:txBody>
+      </p:sp>
+    </p:spTree>
+    <p:extLst>
+      <p:ext uri="{BB962C8B-B14F-4D97-AF65-F5344CB8AC3E}">
+        <p14:creationId xmlns:p14="http://schemas.microsoft.com/office/powerpoint/2010/main" val="1927628795"/>
+      </p:ext>
+    </p:extLst>
+  </p:cSld>
+  <p:clrMapOvr>
+    <a:masterClrMapping/>
+  </p:clrMapOvr>
+  <p:timing>
+    <p:tnLst>
+      <p:par>
+        <p:cTn id="1" dur="indefinite" restart="never" nodeType="tmRoot"/>
+      </p:par>
+    </p:tnLst>
+  </p:timing>
+</p:sld>
+</file>
+
+<file path=ppt/slides/slide6.xml><?xml version="1.0" encoding="utf-8"?>
+<p:sld xmlns:a="http://schemas.openxmlformats.org/drawingml/2006/main" xmlns:r="http://schemas.openxmlformats.org/officeDocument/2006/relationships" xmlns:p="http://schemas.openxmlformats.org/presentationml/2006/main">
+  <p:cSld>
+    <p:spTree>
+      <p:nvGrpSpPr>
+        <p:cNvPr id="1" name=""/>
+        <p:cNvGrpSpPr/>
+        <p:nvPr/>
+      </p:nvGrpSpPr>
+      <p:grpSpPr>
+        <a:xfrm>
+          <a:off x="0" y="0"/>
+          <a:ext cx="0" cy="0"/>
+          <a:chOff x="0" y="0"/>
+          <a:chExt cx="0" cy="0"/>
+        </a:xfrm>
+      </p:grpSpPr>
+      <p:sp>
+        <p:nvSpPr>
+          <p:cNvPr id="2" name="Titel 1"/>
+          <p:cNvSpPr>
+            <a:spLocks noGrp="1"/>
+          </p:cNvSpPr>
+          <p:nvPr>
+            <p:ph type="title"/>
+          </p:nvPr>
+        </p:nvSpPr>
+        <p:spPr/>
+        <p:txBody>
+          <a:bodyPr/>
+          <a:lstStyle/>
+          <a:p>
+            <a:r>
+              <a:rPr lang="de-CH" dirty="0" smtClean="0"/>
+              <a:t>Arbeitsweise</a:t>
+            </a:r>
+            <a:endParaRPr lang="de-CH" dirty="0"/>
+          </a:p>
+        </p:txBody>
+      </p:sp>
+      <p:pic>
+        <p:nvPicPr>
+          <p:cNvPr id="4" name="Inhaltsplatzhalter 3"/>
+          <p:cNvPicPr>
+            <a:picLocks noGrp="1" noChangeAspect="1"/>
+          </p:cNvPicPr>
+          <p:nvPr>
+            <p:ph idx="1"/>
+          </p:nvPr>
+        </p:nvPicPr>
+        <p:blipFill>
+          <a:blip r:embed="rId2">
+            <a:extLst>
+              <a:ext uri="{28A0092B-C50C-407E-A947-70E740481C1C}">
+                <a14:useLocalDpi xmlns:a14="http://schemas.microsoft.com/office/drawing/2010/main" val="0"/>
+              </a:ext>
+            </a:extLst>
+          </a:blip>
+          <a:stretch>
+            <a:fillRect/>
+          </a:stretch>
+        </p:blipFill>
+        <p:spPr>
+          <a:xfrm>
+            <a:off x="467544" y="1200150"/>
+            <a:ext cx="8208911" cy="3819525"/>
+          </a:xfrm>
+        </p:spPr>
+      </p:pic>
+    </p:spTree>
+    <p:extLst>
+      <p:ext uri="{BB962C8B-B14F-4D97-AF65-F5344CB8AC3E}">
+        <p14:creationId xmlns:p14="http://schemas.microsoft.com/office/powerpoint/2010/main" val="2041708397"/>
+      </p:ext>
+    </p:extLst>
+  </p:cSld>
+  <p:clrMapOvr>
+    <a:masterClrMapping/>
+  </p:clrMapOvr>
+  <p:timing>
+    <p:tnLst>
+      <p:par>
+        <p:cTn id="1" dur="indefinite" restart="never" nodeType="tmRoot"/>
+      </p:par>
+    </p:tnLst>
+  </p:timing>
+</p:sld>
+</file>
+
+<file path=ppt/slides/slide7.xml><?xml version="1.0" encoding="utf-8"?>
+<p:sld xmlns:a="http://schemas.openxmlformats.org/drawingml/2006/main" xmlns:r="http://schemas.openxmlformats.org/officeDocument/2006/relationships" xmlns:p="http://schemas.openxmlformats.org/presentationml/2006/main">
+  <p:cSld>
+    <p:spTree>
+      <p:nvGrpSpPr>
+        <p:cNvPr id="1" name=""/>
+        <p:cNvGrpSpPr/>
+        <p:nvPr/>
+      </p:nvGrpSpPr>
+      <p:grpSpPr>
+        <a:xfrm>
+          <a:off x="0" y="0"/>
+          <a:ext cx="0" cy="0"/>
+          <a:chOff x="0" y="0"/>
+          <a:chExt cx="0" cy="0"/>
+        </a:xfrm>
+      </p:grpSpPr>
+      <p:sp>
+        <p:nvSpPr>
+          <p:cNvPr id="2" name="Titel 1"/>
+          <p:cNvSpPr>
+            <a:spLocks noGrp="1"/>
+          </p:cNvSpPr>
+          <p:nvPr>
+            <p:ph type="title"/>
+          </p:nvPr>
+        </p:nvSpPr>
+        <p:spPr/>
+        <p:txBody>
+          <a:bodyPr/>
+          <a:lstStyle/>
+          <a:p>
+            <a:r>
+              <a:rPr lang="de-CH" dirty="0" smtClean="0"/>
+              <a:t>Arbeitsweise</a:t>
+            </a:r>
+            <a:endParaRPr lang="de-CH" dirty="0"/>
+          </a:p>
+        </p:txBody>
+      </p:sp>
+      <p:sp>
+        <p:nvSpPr>
+          <p:cNvPr id="3" name="Inhaltsplatzhalter 2"/>
+          <p:cNvSpPr>
+            <a:spLocks noGrp="1"/>
+          </p:cNvSpPr>
+          <p:nvPr>
+            <p:ph idx="1"/>
+          </p:nvPr>
+        </p:nvSpPr>
+        <p:spPr/>
+        <p:txBody>
+          <a:bodyPr/>
+          <a:lstStyle/>
+          <a:p>
+            <a:r>
+              <a:rPr lang="de-CH" dirty="0" smtClean="0"/>
+              <a:t>Frontend / Logo / Grafisch</a:t>
+            </a:r>
+          </a:p>
+          <a:p>
+            <a:pPr lvl="1"/>
+            <a:r>
+              <a:rPr lang="de-CH" dirty="0" smtClean="0"/>
+              <a:t>Michael</a:t>
+            </a:r>
+          </a:p>
+          <a:p>
+            <a:r>
+              <a:rPr lang="de-CH" dirty="0" smtClean="0"/>
+              <a:t>Backend / Produkt Katalog</a:t>
+            </a:r>
+          </a:p>
+          <a:p>
+            <a:pPr lvl="1"/>
+            <a:r>
+              <a:rPr lang="de-CH" dirty="0" smtClean="0"/>
+              <a:t>Jonas und Pascal</a:t>
+            </a:r>
+          </a:p>
+        </p:txBody>
+      </p:sp>
+    </p:spTree>
+    <p:extLst>
+      <p:ext uri="{BB962C8B-B14F-4D97-AF65-F5344CB8AC3E}">
+        <p14:creationId xmlns:p14="http://schemas.microsoft.com/office/powerpoint/2010/main" val="3473721681"/>
+      </p:ext>
+    </p:extLst>
+  </p:cSld>
+  <p:clrMapOvr>
+    <a:masterClrMapping/>
+  </p:clrMapOvr>
+  <p:timing>
+    <p:tnLst>
+      <p:par>
+        <p:cTn id="1" dur="indefinite" restart="never" nodeType="tmRoot"/>
+      </p:par>
+    </p:tnLst>
+  </p:timing>
+</p:sld>
+</file>
+
+<file path=ppt/slides/slide8.xml><?xml version="1.0" encoding="utf-8"?>
+<p:sld xmlns:a="http://schemas.openxmlformats.org/drawingml/2006/main" xmlns:r="http://schemas.openxmlformats.org/officeDocument/2006/relationships" xmlns:p="http://schemas.openxmlformats.org/presentationml/2006/main">
+  <p:cSld>
+    <p:spTree>
+      <p:nvGrpSpPr>
+        <p:cNvPr id="1" name=""/>
+        <p:cNvGrpSpPr/>
+        <p:nvPr/>
+      </p:nvGrpSpPr>
+      <p:grpSpPr>
+        <a:xfrm>
+          <a:off x="0" y="0"/>
+          <a:ext cx="0" cy="0"/>
+          <a:chOff x="0" y="0"/>
+          <a:chExt cx="0" cy="0"/>
+        </a:xfrm>
+      </p:grpSpPr>
+      <p:sp>
+        <p:nvSpPr>
+          <p:cNvPr id="2" name="Titel 1"/>
+          <p:cNvSpPr>
+            <a:spLocks noGrp="1"/>
+          </p:cNvSpPr>
+          <p:nvPr>
+            <p:ph type="title"/>
+          </p:nvPr>
+        </p:nvSpPr>
+        <p:spPr/>
+        <p:txBody>
+          <a:bodyPr>
+            <a:normAutofit/>
+          </a:bodyPr>
+          <a:lstStyle/>
+          <a:p>
+            <a:r>
+              <a:rPr lang="de-CH" dirty="0" err="1"/>
+              <a:t>Lessons</a:t>
+            </a:r>
+            <a:r>
+              <a:rPr lang="de-CH" dirty="0"/>
+              <a:t> </a:t>
+            </a:r>
+            <a:r>
+              <a:rPr lang="de-CH" dirty="0" err="1" smtClean="0"/>
+              <a:t>learnt</a:t>
+            </a:r>
+            <a:endParaRPr lang="de-CH" dirty="0"/>
+          </a:p>
+        </p:txBody>
+      </p:sp>
+      <p:sp>
+        <p:nvSpPr>
+          <p:cNvPr id="3" name="Inhaltsplatzhalter 2"/>
+          <p:cNvSpPr>
+            <a:spLocks noGrp="1"/>
+          </p:cNvSpPr>
+          <p:nvPr>
+            <p:ph idx="1"/>
+          </p:nvPr>
+        </p:nvSpPr>
+        <p:spPr/>
+        <p:txBody>
+          <a:bodyPr/>
+          <a:lstStyle/>
+          <a:p>
+            <a:r>
+              <a:rPr lang="de-CH" dirty="0" err="1" smtClean="0"/>
+              <a:t>Plain</a:t>
+            </a:r>
+            <a:r>
+              <a:rPr lang="de-CH" dirty="0" smtClean="0"/>
+              <a:t> HTML/CSS/JavaScript hat so seine Unschönheiten</a:t>
+            </a:r>
+          </a:p>
+          <a:p>
+            <a:r>
+              <a:rPr lang="de-CH" dirty="0" smtClean="0"/>
+              <a:t>Kleiner Projekte lassen sich durchaus ohne Frameworks realisieren – Sinnvoll?</a:t>
+            </a:r>
+          </a:p>
+          <a:p>
+            <a:r>
+              <a:rPr lang="de-CH" dirty="0" smtClean="0"/>
+              <a:t>Guter Einblick in die Technologien</a:t>
+            </a:r>
+          </a:p>
+          <a:p>
+            <a:pPr lvl="1"/>
+            <a:r>
+              <a:rPr lang="de-CH" dirty="0" smtClean="0"/>
+              <a:t>Hilft Frameworks besser zu verstehen</a:t>
+            </a:r>
+            <a:endParaRPr lang="de-CH" dirty="0"/>
+          </a:p>
+        </p:txBody>
+      </p:sp>
+    </p:spTree>
+    <p:extLst>
+      <p:ext uri="{BB962C8B-B14F-4D97-AF65-F5344CB8AC3E}">
+        <p14:creationId xmlns:p14="http://schemas.microsoft.com/office/powerpoint/2010/main" val="1982191759"/>
+      </p:ext>
+    </p:extLst>
+  </p:cSld>
+  <p:clrMapOvr>
+    <a:masterClrMapping/>
+  </p:clrMapOvr>
+  <p:timing>
+    <p:tnLst>
+      <p:par>
+        <p:cTn id="1" dur="indefinite" restart="never" nodeType="tmRoot"/>
+      </p:par>
+    </p:tnLst>
+  </p:timing>
+</p:sld>
+</file>
+
+<file path=ppt/slides/slide9.xml><?xml version="1.0" encoding="utf-8"?>
+<p:sld xmlns:a="http://schemas.openxmlformats.org/drawingml/2006/main" xmlns:r="http://schemas.openxmlformats.org/officeDocument/2006/relationships" xmlns:p="http://schemas.openxmlformats.org/presentationml/2006/main">
+  <p:cSld>
+    <p:spTree>
+      <p:nvGrpSpPr>
+        <p:cNvPr id="1" name=""/>
+        <p:cNvGrpSpPr/>
+        <p:nvPr/>
+      </p:nvGrpSpPr>
+      <p:grpSpPr>
+        <a:xfrm>
+          <a:off x="0" y="0"/>
+          <a:ext cx="0" cy="0"/>
+          <a:chOff x="0" y="0"/>
+          <a:chExt cx="0" cy="0"/>
+        </a:xfrm>
+      </p:grpSpPr>
+      <p:sp>
+        <p:nvSpPr>
+          <p:cNvPr id="2" name="Titel 1"/>
+          <p:cNvSpPr>
+            <a:spLocks noGrp="1"/>
+          </p:cNvSpPr>
+          <p:nvPr>
+            <p:ph type="title"/>
+          </p:nvPr>
+        </p:nvSpPr>
+        <p:spPr/>
+        <p:txBody>
+          <a:bodyPr/>
+          <a:lstStyle/>
+          <a:p>
+            <a:r>
+              <a:rPr lang="de-CH" dirty="0" smtClean="0"/>
+              <a:t>Live-Demo</a:t>
+            </a:r>
+            <a:endParaRPr lang="de-CH" dirty="0"/>
+          </a:p>
+        </p:txBody>
+      </p:sp>
+      <p:pic>
+        <p:nvPicPr>
+          <p:cNvPr id="4" name="Inhaltsplatzhalter 3">
+            <a:hlinkClick r:id="rId2"/>
+          </p:cNvPr>
+          <p:cNvPicPr>
+            <a:picLocks noGrp="1" noChangeAspect="1"/>
+          </p:cNvPicPr>
+          <p:nvPr>
+            <p:ph idx="1"/>
+          </p:nvPr>
+        </p:nvPicPr>
+        <p:blipFill>
+          <a:blip r:embed="rId3">
+            <a:extLst>
+              <a:ext uri="{28A0092B-C50C-407E-A947-70E740481C1C}">
+                <a14:useLocalDpi xmlns:a14="http://schemas.microsoft.com/office/drawing/2010/main" val="0"/>
+              </a:ext>
+            </a:extLst>
+          </a:blip>
+          <a:stretch>
+            <a:fillRect/>
+          </a:stretch>
+        </p:blipFill>
+        <p:spPr>
+          <a:xfrm>
+            <a:off x="1430744" y="1200150"/>
+            <a:ext cx="6282511" cy="3532188"/>
+          </a:xfrm>
+        </p:spPr>
+      </p:pic>
+    </p:spTree>
+    <p:extLst>
+      <p:ext uri="{BB962C8B-B14F-4D97-AF65-F5344CB8AC3E}">
+        <p14:creationId xmlns:p14="http://schemas.microsoft.com/office/powerpoint/2010/main" val="958242197"/>
+      </p:ext>
+    </p:extLst>
+  </p:cSld>
+  <p:clrMapOvr>
+    <a:masterClrMapping/>
+  </p:clrMapOvr>
+  <p:timing>
+    <p:tnLst>
+      <p:par>
+        <p:cTn id="1" dur="indefinite" restart="never" nodeType="tmRoot"/>
+      </p:par>
+    </p:tnLst>
   </p:timing>
 </p:sld>
 </file>

</xml_diff>